<commit_message>
Pdf de la proposition OC Pizza
</commit_message>
<xml_diff>
--- a/persona et shéma de fonctionnement ecommerce.pptx
+++ b/persona et shéma de fonctionnement ecommerce.pptx
@@ -10,6 +10,7 @@
     <p:sldId id="258" r:id="rId4"/>
     <p:sldId id="259" r:id="rId5"/>
     <p:sldId id="260" r:id="rId6"/>
+    <p:sldId id="261" r:id="rId7"/>
   </p:sldIdLst>
   <p:sldSz cx="12192000" cy="6858000"/>
   <p:notesSz cx="6858000" cy="9144000"/>
@@ -263,7 +264,7 @@
           <a:p>
             <a:fld id="{CC845781-86CD-A944-9445-314D87DFF735}" type="datetimeFigureOut">
               <a:rPr lang="fr-FR" smtClean="0"/>
-              <a:t>07/05/2021</a:t>
+              <a:t>11/05/2021</a:t>
             </a:fld>
             <a:endParaRPr lang="fr-FR" dirty="0"/>
           </a:p>
@@ -461,7 +462,7 @@
           <a:p>
             <a:fld id="{CC845781-86CD-A944-9445-314D87DFF735}" type="datetimeFigureOut">
               <a:rPr lang="fr-FR" smtClean="0"/>
-              <a:t>07/05/2021</a:t>
+              <a:t>11/05/2021</a:t>
             </a:fld>
             <a:endParaRPr lang="fr-FR" dirty="0"/>
           </a:p>
@@ -669,7 +670,7 @@
           <a:p>
             <a:fld id="{CC845781-86CD-A944-9445-314D87DFF735}" type="datetimeFigureOut">
               <a:rPr lang="fr-FR" smtClean="0"/>
-              <a:t>07/05/2021</a:t>
+              <a:t>11/05/2021</a:t>
             </a:fld>
             <a:endParaRPr lang="fr-FR" dirty="0"/>
           </a:p>
@@ -867,7 +868,7 @@
           <a:p>
             <a:fld id="{CC845781-86CD-A944-9445-314D87DFF735}" type="datetimeFigureOut">
               <a:rPr lang="fr-FR" smtClean="0"/>
-              <a:t>07/05/2021</a:t>
+              <a:t>11/05/2021</a:t>
             </a:fld>
             <a:endParaRPr lang="fr-FR" dirty="0"/>
           </a:p>
@@ -1142,7 +1143,7 @@
           <a:p>
             <a:fld id="{CC845781-86CD-A944-9445-314D87DFF735}" type="datetimeFigureOut">
               <a:rPr lang="fr-FR" smtClean="0"/>
-              <a:t>07/05/2021</a:t>
+              <a:t>11/05/2021</a:t>
             </a:fld>
             <a:endParaRPr lang="fr-FR" dirty="0"/>
           </a:p>
@@ -1407,7 +1408,7 @@
           <a:p>
             <a:fld id="{CC845781-86CD-A944-9445-314D87DFF735}" type="datetimeFigureOut">
               <a:rPr lang="fr-FR" smtClean="0"/>
-              <a:t>07/05/2021</a:t>
+              <a:t>11/05/2021</a:t>
             </a:fld>
             <a:endParaRPr lang="fr-FR" dirty="0"/>
           </a:p>
@@ -1819,7 +1820,7 @@
           <a:p>
             <a:fld id="{CC845781-86CD-A944-9445-314D87DFF735}" type="datetimeFigureOut">
               <a:rPr lang="fr-FR" smtClean="0"/>
-              <a:t>07/05/2021</a:t>
+              <a:t>11/05/2021</a:t>
             </a:fld>
             <a:endParaRPr lang="fr-FR" dirty="0"/>
           </a:p>
@@ -1960,7 +1961,7 @@
           <a:p>
             <a:fld id="{CC845781-86CD-A944-9445-314D87DFF735}" type="datetimeFigureOut">
               <a:rPr lang="fr-FR" smtClean="0"/>
-              <a:t>07/05/2021</a:t>
+              <a:t>11/05/2021</a:t>
             </a:fld>
             <a:endParaRPr lang="fr-FR" dirty="0"/>
           </a:p>
@@ -2073,7 +2074,7 @@
           <a:p>
             <a:fld id="{CC845781-86CD-A944-9445-314D87DFF735}" type="datetimeFigureOut">
               <a:rPr lang="fr-FR" smtClean="0"/>
-              <a:t>07/05/2021</a:t>
+              <a:t>11/05/2021</a:t>
             </a:fld>
             <a:endParaRPr lang="fr-FR" dirty="0"/>
           </a:p>
@@ -2384,7 +2385,7 @@
           <a:p>
             <a:fld id="{CC845781-86CD-A944-9445-314D87DFF735}" type="datetimeFigureOut">
               <a:rPr lang="fr-FR" smtClean="0"/>
-              <a:t>07/05/2021</a:t>
+              <a:t>11/05/2021</a:t>
             </a:fld>
             <a:endParaRPr lang="fr-FR" dirty="0"/>
           </a:p>
@@ -2672,7 +2673,7 @@
           <a:p>
             <a:fld id="{CC845781-86CD-A944-9445-314D87DFF735}" type="datetimeFigureOut">
               <a:rPr lang="fr-FR" smtClean="0"/>
-              <a:t>07/05/2021</a:t>
+              <a:t>11/05/2021</a:t>
             </a:fld>
             <a:endParaRPr lang="fr-FR" dirty="0"/>
           </a:p>
@@ -2913,7 +2914,7 @@
           <a:p>
             <a:fld id="{CC845781-86CD-A944-9445-314D87DFF735}" type="datetimeFigureOut">
               <a:rPr lang="fr-FR" smtClean="0"/>
-              <a:t>07/05/2021</a:t>
+              <a:t>11/05/2021</a:t>
             </a:fld>
             <a:endParaRPr lang="fr-FR" dirty="0"/>
           </a:p>
@@ -7094,6 +7095,106 @@
           </a:p>
         </p:txBody>
       </p:sp>
+      <p:sp>
+        <p:nvSpPr>
+          <p:cNvPr id="2" name="Flèche courbée vers la gauche 1">
+            <a:extLst>
+              <a:ext uri="{FF2B5EF4-FFF2-40B4-BE49-F238E27FC236}">
+                <a16:creationId xmlns:a16="http://schemas.microsoft.com/office/drawing/2014/main" id="{F6BC5462-B6AE-3F4C-8729-868116DCA7AA}"/>
+              </a:ext>
+            </a:extLst>
+          </p:cNvPr>
+          <p:cNvSpPr/>
+          <p:nvPr/>
+        </p:nvSpPr>
+        <p:spPr>
+          <a:xfrm rot="10800000" flipH="1">
+            <a:off x="8318652" y="2733098"/>
+            <a:ext cx="479359" cy="1370637"/>
+          </a:xfrm>
+          <a:prstGeom prst="curvedLeftArrow">
+            <a:avLst/>
+          </a:prstGeom>
+        </p:spPr>
+        <p:style>
+          <a:lnRef idx="2">
+            <a:schemeClr val="accent1">
+              <a:shade val="50000"/>
+            </a:schemeClr>
+          </a:lnRef>
+          <a:fillRef idx="1">
+            <a:schemeClr val="accent1"/>
+          </a:fillRef>
+          <a:effectRef idx="0">
+            <a:schemeClr val="accent1"/>
+          </a:effectRef>
+          <a:fontRef idx="minor">
+            <a:schemeClr val="lt1"/>
+          </a:fontRef>
+        </p:style>
+        <p:txBody>
+          <a:bodyPr rtlCol="0" anchor="ctr"/>
+          <a:lstStyle/>
+          <a:p>
+            <a:pPr algn="ctr"/>
+            <a:endParaRPr lang="fr-FR">
+              <a:solidFill>
+                <a:schemeClr val="tx1"/>
+              </a:solidFill>
+            </a:endParaRPr>
+          </a:p>
+        </p:txBody>
+      </p:sp>
+      <p:sp>
+        <p:nvSpPr>
+          <p:cNvPr id="42" name="Flèche courbée vers la gauche 41">
+            <a:extLst>
+              <a:ext uri="{FF2B5EF4-FFF2-40B4-BE49-F238E27FC236}">
+                <a16:creationId xmlns:a16="http://schemas.microsoft.com/office/drawing/2014/main" id="{E364EE9E-4BAD-DF4D-91E7-A4F34DD3067E}"/>
+              </a:ext>
+            </a:extLst>
+          </p:cNvPr>
+          <p:cNvSpPr/>
+          <p:nvPr/>
+        </p:nvSpPr>
+        <p:spPr>
+          <a:xfrm rot="10800000" flipV="1">
+            <a:off x="3458715" y="2704919"/>
+            <a:ext cx="529721" cy="1473784"/>
+          </a:xfrm>
+          <a:prstGeom prst="curvedLeftArrow">
+            <a:avLst/>
+          </a:prstGeom>
+        </p:spPr>
+        <p:style>
+          <a:lnRef idx="2">
+            <a:schemeClr val="accent1">
+              <a:shade val="50000"/>
+            </a:schemeClr>
+          </a:lnRef>
+          <a:fillRef idx="1">
+            <a:schemeClr val="accent1"/>
+          </a:fillRef>
+          <a:effectRef idx="0">
+            <a:schemeClr val="accent1"/>
+          </a:effectRef>
+          <a:fontRef idx="minor">
+            <a:schemeClr val="lt1"/>
+          </a:fontRef>
+        </p:style>
+        <p:txBody>
+          <a:bodyPr rtlCol="0" anchor="ctr"/>
+          <a:lstStyle/>
+          <a:p>
+            <a:pPr algn="ctr"/>
+            <a:endParaRPr lang="fr-FR" dirty="0">
+              <a:solidFill>
+                <a:schemeClr val="tx1"/>
+              </a:solidFill>
+            </a:endParaRPr>
+          </a:p>
+        </p:txBody>
+      </p:sp>
     </p:spTree>
     <p:extLst>
       <p:ext uri="{BB962C8B-B14F-4D97-AF65-F5344CB8AC3E}">
@@ -11547,7 +11648,7 @@
               <a:rPr lang="fr-FR" sz="1600" dirty="0">
                 <a:latin typeface="Amasis MT Pro" panose="02040504050005020304" pitchFamily="18" charset="77"/>
               </a:rPr>
-              <a:t>Antoine est directeur marketing donc entre deux réunions il mange souvent le midi sur le pouce et commande souvent sur les applications spécialisées. Il aimerait un service de pizzeria son péché mignon qui respecte bien la commande et qui notifie à chaque étape de la préparation à la livraison. Souvent déçu par le temps pris mais aussi des commandes incomplètes. </a:t>
+              <a:t>Antoine est directeur marketing donc entre deux réunions il mange souvent le midi sur le pouce et commande souvent sur les applications spécialisées. Il aimerait un service de pizzeria, son péché mignon qui respecte bien la commande et qui notifie à chaque étape de la préparation à la livraison. Souvent déçu par le temps pris mais aussi des commandes incomplètes. </a:t>
             </a:r>
           </a:p>
         </p:txBody>
@@ -11692,7 +11793,7 @@
           <a:p>
             <a:r>
               <a:rPr lang="fr-FR" dirty="0"/>
-              <a:t>2 506 €</a:t>
+              <a:t>4 600 €</a:t>
             </a:r>
             <a:r>
               <a:rPr lang="fr-FR" sz="1600" dirty="0">
@@ -11722,7 +11823,7 @@
               <a:rPr lang="fr-FR" sz="1600" dirty="0">
                 <a:latin typeface="Amasis MT Pro" panose="02040504050005020304" pitchFamily="18" charset="77"/>
               </a:rPr>
-              <a:t>Déterminée </a:t>
+              <a:t> Pointilleux</a:t>
             </a:r>
           </a:p>
         </p:txBody>
@@ -13416,6 +13517,36 @@
     <p:extLst>
       <p:ext uri="{BB962C8B-B14F-4D97-AF65-F5344CB8AC3E}">
         <p14:creationId xmlns:p14="http://schemas.microsoft.com/office/powerpoint/2010/main" val="275149329"/>
+      </p:ext>
+    </p:extLst>
+  </p:cSld>
+  <p:clrMapOvr>
+    <a:masterClrMapping/>
+  </p:clrMapOvr>
+</p:sld>
+</file>
+
+<file path=ppt/slides/slide6.xml><?xml version="1.0" encoding="utf-8"?>
+<p:sld xmlns:a="http://schemas.openxmlformats.org/drawingml/2006/main" xmlns:r="http://schemas.openxmlformats.org/officeDocument/2006/relationships" xmlns:p="http://schemas.openxmlformats.org/presentationml/2006/main">
+  <p:cSld>
+    <p:spTree>
+      <p:nvGrpSpPr>
+        <p:cNvPr id="1" name=""/>
+        <p:cNvGrpSpPr/>
+        <p:nvPr/>
+      </p:nvGrpSpPr>
+      <p:grpSpPr>
+        <a:xfrm>
+          <a:off x="0" y="0"/>
+          <a:ext cx="0" cy="0"/>
+          <a:chOff x="0" y="0"/>
+          <a:chExt cx="0" cy="0"/>
+        </a:xfrm>
+      </p:grpSpPr>
+    </p:spTree>
+    <p:extLst>
+      <p:ext uri="{BB962C8B-B14F-4D97-AF65-F5344CB8AC3E}">
+        <p14:creationId xmlns:p14="http://schemas.microsoft.com/office/powerpoint/2010/main" val="1965581724"/>
       </p:ext>
     </p:extLst>
   </p:cSld>

</xml_diff>